<commit_message>
Lab4 & 5 slides
</commit_message>
<xml_diff>
--- a/Presentations/Setup_lab01.pptx
+++ b/Presentations/Setup_lab01.pptx
@@ -5,7 +5,7 @@
     <p:sldMasterId id="2147483671" r:id="rId1"/>
   </p:sldMasterIdLst>
   <p:notesMasterIdLst>
-    <p:notesMasterId r:id="rId13"/>
+    <p:notesMasterId r:id="rId12"/>
   </p:notesMasterIdLst>
   <p:sldIdLst>
     <p:sldId id="256" r:id="rId2"/>
@@ -18,7 +18,6 @@
     <p:sldId id="263" r:id="rId9"/>
     <p:sldId id="264" r:id="rId10"/>
     <p:sldId id="265" r:id="rId11"/>
-    <p:sldId id="266" r:id="rId12"/>
   </p:sldIdLst>
   <p:sldSz cx="9144000" cy="5143500" type="screen16x9"/>
   <p:notesSz cx="6858000" cy="9144000"/>
@@ -2053,113 +2052,6 @@
     <p:extLst>
       <p:ext uri="{BB962C8B-B14F-4D97-AF65-F5344CB8AC3E}">
         <p14:creationId xmlns:p14="http://schemas.microsoft.com/office/powerpoint/2010/main" val="1120503919"/>
-      </p:ext>
-    </p:extLst>
-  </p:cSld>
-  <p:clrMapOvr>
-    <a:masterClrMapping/>
-  </p:clrMapOvr>
-</p:notes>
-</file>
-
-<file path=ppt/notesSlides/notesSlide9.xml><?xml version="1.0" encoding="utf-8"?>
-<p:notes xmlns:a="http://schemas.openxmlformats.org/drawingml/2006/main" xmlns:r="http://schemas.openxmlformats.org/officeDocument/2006/relationships" xmlns:p="http://schemas.openxmlformats.org/presentationml/2006/main">
-  <p:cSld>
-    <p:spTree>
-      <p:nvGrpSpPr>
-        <p:cNvPr id="1" name=""/>
-        <p:cNvGrpSpPr/>
-        <p:nvPr/>
-      </p:nvGrpSpPr>
-      <p:grpSpPr>
-        <a:xfrm>
-          <a:off x="0" y="0"/>
-          <a:ext cx="0" cy="0"/>
-          <a:chOff x="0" y="0"/>
-          <a:chExt cx="0" cy="0"/>
-        </a:xfrm>
-      </p:grpSpPr>
-      <p:sp>
-        <p:nvSpPr>
-          <p:cNvPr id="2" name="Slide Image Placeholder 1"/>
-          <p:cNvSpPr>
-            <a:spLocks noGrp="1" noRot="1" noChangeAspect="1"/>
-          </p:cNvSpPr>
-          <p:nvPr>
-            <p:ph type="sldImg"/>
-          </p:nvPr>
-        </p:nvSpPr>
-        <p:spPr/>
-      </p:sp>
-      <p:sp>
-        <p:nvSpPr>
-          <p:cNvPr id="3" name="Notes Placeholder 2"/>
-          <p:cNvSpPr>
-            <a:spLocks noGrp="1"/>
-          </p:cNvSpPr>
-          <p:nvPr>
-            <p:ph type="body" idx="1"/>
-          </p:nvPr>
-        </p:nvSpPr>
-        <p:spPr/>
-        <p:txBody>
-          <a:bodyPr/>
-          <a:lstStyle/>
-          <a:p>
-            <a:endParaRPr lang="en-US" dirty="0"/>
-          </a:p>
-        </p:txBody>
-      </p:sp>
-      <p:sp>
-        <p:nvSpPr>
-          <p:cNvPr id="4" name="Slide Number Placeholder 3"/>
-          <p:cNvSpPr>
-            <a:spLocks noGrp="1"/>
-          </p:cNvSpPr>
-          <p:nvPr>
-            <p:ph type="sldNum" idx="10"/>
-          </p:nvPr>
-        </p:nvSpPr>
-        <p:spPr/>
-        <p:txBody>
-          <a:bodyPr/>
-          <a:lstStyle/>
-          <a:p>
-            <a:pPr marL="0" marR="0" lvl="0" indent="0" algn="r" rtl="0">
-              <a:spcBef>
-                <a:spcPts val="0"/>
-              </a:spcBef>
-              <a:buSzPct val="25000"/>
-              <a:buNone/>
-            </a:pPr>
-            <a:fld id="{00000000-1234-1234-1234-123412341234}" type="slidenum">
-              <a:rPr lang="en-US" sz="1200" b="0" i="0" u="none" strike="noStrike" cap="none" smtClean="0">
-                <a:solidFill>
-                  <a:schemeClr val="dk1"/>
-                </a:solidFill>
-                <a:latin typeface="Calibri"/>
-                <a:ea typeface="Calibri"/>
-                <a:cs typeface="Calibri"/>
-                <a:sym typeface="Calibri"/>
-              </a:rPr>
-              <a:t>11</a:t>
-            </a:fld>
-            <a:endParaRPr lang="en-US" sz="1200" b="0" i="0" u="none" strike="noStrike" cap="none">
-              <a:solidFill>
-                <a:schemeClr val="dk1"/>
-              </a:solidFill>
-              <a:latin typeface="Calibri"/>
-              <a:ea typeface="Calibri"/>
-              <a:cs typeface="Calibri"/>
-              <a:sym typeface="Calibri"/>
-            </a:endParaRPr>
-          </a:p>
-        </p:txBody>
-      </p:sp>
-    </p:spTree>
-    <p:extLst>
-      <p:ext uri="{BB962C8B-B14F-4D97-AF65-F5344CB8AC3E}">
-        <p14:creationId xmlns:p14="http://schemas.microsoft.com/office/powerpoint/2010/main" val="4154326273"/>
       </p:ext>
     </p:extLst>
   </p:cSld>
@@ -12335,748 +12227,6 @@
       </p:par>
     </p:tnLst>
   </p:timing>
-</p:sld>
-</file>
-
-<file path=ppt/slides/slide11.xml><?xml version="1.0" encoding="utf-8"?>
-<p:sld xmlns:a="http://schemas.openxmlformats.org/drawingml/2006/main" xmlns:r="http://schemas.openxmlformats.org/officeDocument/2006/relationships" xmlns:p="http://schemas.openxmlformats.org/presentationml/2006/main">
-  <p:cSld>
-    <p:spTree>
-      <p:nvGrpSpPr>
-        <p:cNvPr id="1" name=""/>
-        <p:cNvGrpSpPr/>
-        <p:nvPr/>
-      </p:nvGrpSpPr>
-      <p:grpSpPr>
-        <a:xfrm>
-          <a:off x="0" y="0"/>
-          <a:ext cx="0" cy="0"/>
-          <a:chOff x="0" y="0"/>
-          <a:chExt cx="0" cy="0"/>
-        </a:xfrm>
-      </p:grpSpPr>
-      <p:sp>
-        <p:nvSpPr>
-          <p:cNvPr id="7" name="Rectangle 6"/>
-          <p:cNvSpPr/>
-          <p:nvPr/>
-        </p:nvSpPr>
-        <p:spPr>
-          <a:xfrm>
-            <a:off x="2108200" y="2184400"/>
-            <a:ext cx="6413500" cy="2247900"/>
-          </a:xfrm>
-          <a:prstGeom prst="rect">
-            <a:avLst/>
-          </a:prstGeom>
-          <a:solidFill>
-            <a:schemeClr val="accent1">
-              <a:lumMod val="20000"/>
-              <a:lumOff val="80000"/>
-            </a:schemeClr>
-          </a:solidFill>
-        </p:spPr>
-        <p:style>
-          <a:lnRef idx="1">
-            <a:schemeClr val="accent1"/>
-          </a:lnRef>
-          <a:fillRef idx="3">
-            <a:schemeClr val="accent1"/>
-          </a:fillRef>
-          <a:effectRef idx="2">
-            <a:schemeClr val="accent1"/>
-          </a:effectRef>
-          <a:fontRef idx="minor">
-            <a:schemeClr val="lt1"/>
-          </a:fontRef>
-        </p:style>
-        <p:txBody>
-          <a:bodyPr rtlCol="0" anchor="ctr"/>
-          <a:lstStyle/>
-          <a:p>
-            <a:pPr algn="ctr"/>
-            <a:r>
-              <a:rPr lang="en-US" dirty="0" err="1" smtClean="0">
-                <a:solidFill>
-                  <a:schemeClr val="tx1"/>
-                </a:solidFill>
-              </a:rPr>
-              <a:t>VBox</a:t>
-            </a:r>
-            <a:endParaRPr lang="en-US" dirty="0">
-              <a:solidFill>
-                <a:schemeClr val="tx1"/>
-              </a:solidFill>
-            </a:endParaRPr>
-          </a:p>
-        </p:txBody>
-      </p:sp>
-      <p:pic>
-        <p:nvPicPr>
-          <p:cNvPr id="34" name="Picture 33"/>
-          <p:cNvPicPr>
-            <a:picLocks noChangeAspect="1"/>
-          </p:cNvPicPr>
-          <p:nvPr/>
-        </p:nvPicPr>
-        <p:blipFill>
-          <a:blip r:embed="rId3"/>
-          <a:stretch>
-            <a:fillRect/>
-          </a:stretch>
-        </p:blipFill>
-        <p:spPr>
-          <a:xfrm>
-            <a:off x="4775200" y="2199216"/>
-            <a:ext cx="1473790" cy="960967"/>
-          </a:xfrm>
-          <a:prstGeom prst="rect">
-            <a:avLst/>
-          </a:prstGeom>
-        </p:spPr>
-      </p:pic>
-      <p:sp>
-        <p:nvSpPr>
-          <p:cNvPr id="2" name="Title 1"/>
-          <p:cNvSpPr>
-            <a:spLocks noGrp="1"/>
-          </p:cNvSpPr>
-          <p:nvPr>
-            <p:ph type="title"/>
-          </p:nvPr>
-        </p:nvSpPr>
-        <p:spPr/>
-        <p:txBody>
-          <a:bodyPr/>
-          <a:lstStyle/>
-          <a:p>
-            <a:r>
-              <a:rPr lang="en-US" dirty="0" smtClean="0"/>
-              <a:t>Laptop Environment for Lab</a:t>
-            </a:r>
-            <a:endParaRPr lang="en-US" dirty="0"/>
-          </a:p>
-        </p:txBody>
-      </p:sp>
-      <p:sp>
-        <p:nvSpPr>
-          <p:cNvPr id="4" name="Rounded Rectangle 3"/>
-          <p:cNvSpPr/>
-          <p:nvPr/>
-        </p:nvSpPr>
-        <p:spPr>
-          <a:xfrm>
-            <a:off x="1189555" y="1117600"/>
-            <a:ext cx="7687745" cy="3390900"/>
-          </a:xfrm>
-          <a:prstGeom prst="roundRect">
-            <a:avLst/>
-          </a:prstGeom>
-          <a:noFill/>
-          <a:ln w="25400"/>
-        </p:spPr>
-        <p:style>
-          <a:lnRef idx="1">
-            <a:schemeClr val="accent1"/>
-          </a:lnRef>
-          <a:fillRef idx="3">
-            <a:schemeClr val="accent1"/>
-          </a:fillRef>
-          <a:effectRef idx="2">
-            <a:schemeClr val="accent1"/>
-          </a:effectRef>
-          <a:fontRef idx="minor">
-            <a:schemeClr val="lt1"/>
-          </a:fontRef>
-        </p:style>
-        <p:txBody>
-          <a:bodyPr rtlCol="0" anchor="ctr"/>
-          <a:lstStyle/>
-          <a:p>
-            <a:pPr algn="ctr"/>
-            <a:endParaRPr lang="en-US"/>
-          </a:p>
-        </p:txBody>
-      </p:sp>
-      <p:cxnSp>
-        <p:nvCxnSpPr>
-          <p:cNvPr id="9" name="Straight Arrow Connector 8"/>
-          <p:cNvCxnSpPr/>
-          <p:nvPr/>
-        </p:nvCxnSpPr>
-        <p:spPr>
-          <a:xfrm>
-            <a:off x="5359400" y="3492500"/>
-            <a:ext cx="787400" cy="276422"/>
-          </a:xfrm>
-          <a:prstGeom prst="straightConnector1">
-            <a:avLst/>
-          </a:prstGeom>
-          <a:ln>
-            <a:tailEnd type="arrow"/>
-          </a:ln>
-        </p:spPr>
-        <p:style>
-          <a:lnRef idx="2">
-            <a:schemeClr val="accent1"/>
-          </a:lnRef>
-          <a:fillRef idx="0">
-            <a:schemeClr val="accent1"/>
-          </a:fillRef>
-          <a:effectRef idx="1">
-            <a:schemeClr val="accent1"/>
-          </a:effectRef>
-          <a:fontRef idx="minor">
-            <a:schemeClr val="tx1"/>
-          </a:fontRef>
-        </p:style>
-      </p:cxnSp>
-      <p:sp>
-        <p:nvSpPr>
-          <p:cNvPr id="15" name="Trapezoid 14"/>
-          <p:cNvSpPr/>
-          <p:nvPr/>
-        </p:nvSpPr>
-        <p:spPr>
-          <a:xfrm>
-            <a:off x="2108200" y="1739900"/>
-            <a:ext cx="6413500" cy="444500"/>
-          </a:xfrm>
-          <a:prstGeom prst="trapezoid">
-            <a:avLst/>
-          </a:prstGeom>
-          <a:solidFill>
-            <a:schemeClr val="accent4">
-              <a:lumMod val="60000"/>
-              <a:lumOff val="40000"/>
-            </a:schemeClr>
-          </a:solidFill>
-        </p:spPr>
-        <p:style>
-          <a:lnRef idx="1">
-            <a:schemeClr val="accent1"/>
-          </a:lnRef>
-          <a:fillRef idx="3">
-            <a:schemeClr val="accent1"/>
-          </a:fillRef>
-          <a:effectRef idx="2">
-            <a:schemeClr val="accent1"/>
-          </a:effectRef>
-          <a:fontRef idx="minor">
-            <a:schemeClr val="lt1"/>
-          </a:fontRef>
-        </p:style>
-        <p:txBody>
-          <a:bodyPr rtlCol="0" anchor="ctr"/>
-          <a:lstStyle/>
-          <a:p>
-            <a:pPr algn="ctr"/>
-            <a:r>
-              <a:rPr lang="en-US" dirty="0" smtClean="0"/>
-              <a:t>Vagrant</a:t>
-            </a:r>
-            <a:endParaRPr lang="en-US" dirty="0"/>
-          </a:p>
-        </p:txBody>
-      </p:sp>
-      <p:grpSp>
-        <p:nvGrpSpPr>
-          <p:cNvPr id="36" name="Group 35"/>
-          <p:cNvGrpSpPr/>
-          <p:nvPr/>
-        </p:nvGrpSpPr>
-        <p:grpSpPr>
-          <a:xfrm>
-            <a:off x="6146800" y="2489200"/>
-            <a:ext cx="2286000" cy="1790700"/>
-            <a:chOff x="6146800" y="2489200"/>
-            <a:chExt cx="2286000" cy="1790700"/>
-          </a:xfrm>
-        </p:grpSpPr>
-        <p:sp>
-          <p:nvSpPr>
-            <p:cNvPr id="5" name="Snip Same Side Corner Rectangle 4"/>
-            <p:cNvSpPr/>
-            <p:nvPr/>
-          </p:nvSpPr>
-          <p:spPr>
-            <a:xfrm>
-              <a:off x="6146800" y="2489200"/>
-              <a:ext cx="2286000" cy="1790700"/>
-            </a:xfrm>
-            <a:prstGeom prst="snip2SameRect">
-              <a:avLst/>
-            </a:prstGeom>
-          </p:spPr>
-          <p:style>
-            <a:lnRef idx="1">
-              <a:schemeClr val="accent1"/>
-            </a:lnRef>
-            <a:fillRef idx="3">
-              <a:schemeClr val="accent1"/>
-            </a:fillRef>
-            <a:effectRef idx="2">
-              <a:schemeClr val="accent1"/>
-            </a:effectRef>
-            <a:fontRef idx="minor">
-              <a:schemeClr val="lt1"/>
-            </a:fontRef>
-          </p:style>
-          <p:txBody>
-            <a:bodyPr rtlCol="0" anchor="b"/>
-            <a:lstStyle/>
-            <a:p>
-              <a:pPr algn="ctr"/>
-              <a:r>
-                <a:rPr lang="en-US" b="1" dirty="0" err="1" smtClean="0"/>
-                <a:t>PcfDev</a:t>
-              </a:r>
-              <a:r>
-                <a:rPr lang="en-US" dirty="0" smtClean="0"/>
-                <a:t>: </a:t>
-              </a:r>
-              <a:r>
-                <a:rPr lang="en-US" sz="1200" dirty="0" smtClean="0"/>
-                <a:t>192.168.11.11</a:t>
-              </a:r>
-              <a:endParaRPr lang="en-US" sz="1200" dirty="0"/>
-            </a:p>
-          </p:txBody>
-        </p:sp>
-        <p:sp>
-          <p:nvSpPr>
-            <p:cNvPr id="13" name="TextBox 12"/>
-            <p:cNvSpPr txBox="1"/>
-            <p:nvPr/>
-          </p:nvSpPr>
-          <p:spPr>
-            <a:xfrm>
-              <a:off x="6146800" y="3653134"/>
-              <a:ext cx="466794" cy="307777"/>
-            </a:xfrm>
-            <a:prstGeom prst="rect">
-              <a:avLst/>
-            </a:prstGeom>
-            <a:noFill/>
-          </p:spPr>
-          <p:txBody>
-            <a:bodyPr wrap="none" rtlCol="0">
-              <a:spAutoFit/>
-            </a:bodyPr>
-            <a:lstStyle/>
-            <a:p>
-              <a:r>
-                <a:rPr lang="en-US" dirty="0" smtClean="0"/>
-                <a:t>VM</a:t>
-              </a:r>
-              <a:endParaRPr lang="en-US" dirty="0"/>
-            </a:p>
-          </p:txBody>
-        </p:sp>
-        <p:pic>
-          <p:nvPicPr>
-            <p:cNvPr id="18" name="Picture 17"/>
-            <p:cNvPicPr>
-              <a:picLocks noChangeAspect="1"/>
-            </p:cNvPicPr>
-            <p:nvPr/>
-          </p:nvPicPr>
-          <p:blipFill>
-            <a:blip r:embed="rId4"/>
-            <a:stretch>
-              <a:fillRect/>
-            </a:stretch>
-          </p:blipFill>
-          <p:spPr>
-            <a:xfrm>
-              <a:off x="6575494" y="2565401"/>
-              <a:ext cx="1527438" cy="1435099"/>
-            </a:xfrm>
-            <a:prstGeom prst="rect">
-              <a:avLst/>
-            </a:prstGeom>
-          </p:spPr>
-        </p:pic>
-      </p:grpSp>
-      <p:grpSp>
-        <p:nvGrpSpPr>
-          <p:cNvPr id="35" name="Group 34"/>
-          <p:cNvGrpSpPr/>
-          <p:nvPr/>
-        </p:nvGrpSpPr>
-        <p:grpSpPr>
-          <a:xfrm>
-            <a:off x="2565400" y="2489200"/>
-            <a:ext cx="2806700" cy="1790700"/>
-            <a:chOff x="2565400" y="2489200"/>
-            <a:chExt cx="2806700" cy="1790700"/>
-          </a:xfrm>
-        </p:grpSpPr>
-        <p:sp>
-          <p:nvSpPr>
-            <p:cNvPr id="6" name="Snip Same Side Corner Rectangle 5"/>
-            <p:cNvSpPr/>
-            <p:nvPr/>
-          </p:nvSpPr>
-          <p:spPr>
-            <a:xfrm>
-              <a:off x="2565400" y="2489200"/>
-              <a:ext cx="2286000" cy="1790700"/>
-            </a:xfrm>
-            <a:prstGeom prst="snip2SameRect">
-              <a:avLst/>
-            </a:prstGeom>
-          </p:spPr>
-          <p:style>
-            <a:lnRef idx="1">
-              <a:schemeClr val="accent1"/>
-            </a:lnRef>
-            <a:fillRef idx="3">
-              <a:schemeClr val="accent1"/>
-            </a:fillRef>
-            <a:effectRef idx="2">
-              <a:schemeClr val="accent1"/>
-            </a:effectRef>
-            <a:fontRef idx="minor">
-              <a:schemeClr val="lt1"/>
-            </a:fontRef>
-          </p:style>
-          <p:txBody>
-            <a:bodyPr rtlCol="0" anchor="b"/>
-            <a:lstStyle/>
-            <a:p>
-              <a:pPr algn="ctr"/>
-              <a:r>
-                <a:rPr lang="en-US" b="1" dirty="0" smtClean="0"/>
-                <a:t>Bosh-Lite</a:t>
-              </a:r>
-              <a:br>
-                <a:rPr lang="en-US" b="1" dirty="0" smtClean="0"/>
-              </a:br>
-              <a:r>
-                <a:rPr lang="en-US" dirty="0" smtClean="0"/>
-                <a:t>192.168.50.4</a:t>
-              </a:r>
-              <a:endParaRPr lang="en-US" dirty="0"/>
-            </a:p>
-          </p:txBody>
-        </p:sp>
-        <p:cxnSp>
-          <p:nvCxnSpPr>
-            <p:cNvPr id="10" name="Straight Arrow Connector 9"/>
-            <p:cNvCxnSpPr>
-              <a:endCxn id="14" idx="3"/>
-            </p:cNvCxnSpPr>
-            <p:nvPr/>
-          </p:nvCxnSpPr>
-          <p:spPr>
-            <a:xfrm flipH="1">
-              <a:off x="4851400" y="3505200"/>
-              <a:ext cx="520700" cy="263722"/>
-            </a:xfrm>
-            <a:prstGeom prst="straightConnector1">
-              <a:avLst/>
-            </a:prstGeom>
-            <a:ln>
-              <a:tailEnd type="arrow"/>
-            </a:ln>
-          </p:spPr>
-          <p:style>
-            <a:lnRef idx="2">
-              <a:schemeClr val="accent1"/>
-            </a:lnRef>
-            <a:fillRef idx="0">
-              <a:schemeClr val="accent1"/>
-            </a:fillRef>
-            <a:effectRef idx="1">
-              <a:schemeClr val="accent1"/>
-            </a:effectRef>
-            <a:fontRef idx="minor">
-              <a:schemeClr val="tx1"/>
-            </a:fontRef>
-          </p:style>
-        </p:cxnSp>
-        <p:sp>
-          <p:nvSpPr>
-            <p:cNvPr id="14" name="TextBox 13"/>
-            <p:cNvSpPr txBox="1"/>
-            <p:nvPr/>
-          </p:nvSpPr>
-          <p:spPr>
-            <a:xfrm>
-              <a:off x="4384606" y="3615033"/>
-              <a:ext cx="466794" cy="307777"/>
-            </a:xfrm>
-            <a:prstGeom prst="rect">
-              <a:avLst/>
-            </a:prstGeom>
-            <a:noFill/>
-          </p:spPr>
-          <p:txBody>
-            <a:bodyPr wrap="none" rtlCol="0">
-              <a:spAutoFit/>
-            </a:bodyPr>
-            <a:lstStyle/>
-            <a:p>
-              <a:r>
-                <a:rPr lang="en-US" dirty="0" smtClean="0"/>
-                <a:t>VM</a:t>
-              </a:r>
-              <a:endParaRPr lang="en-US" dirty="0"/>
-            </a:p>
-          </p:txBody>
-        </p:sp>
-        <p:sp>
-          <p:nvSpPr>
-            <p:cNvPr id="16" name="Oval 15"/>
-            <p:cNvSpPr/>
-            <p:nvPr/>
-          </p:nvSpPr>
-          <p:spPr>
-            <a:xfrm>
-              <a:off x="2667000" y="2679700"/>
-              <a:ext cx="1371600" cy="495300"/>
-            </a:xfrm>
-            <a:prstGeom prst="ellipse">
-              <a:avLst/>
-            </a:prstGeom>
-            <a:solidFill>
-              <a:schemeClr val="accent1">
-                <a:lumMod val="20000"/>
-                <a:lumOff val="80000"/>
-              </a:schemeClr>
-            </a:solidFill>
-          </p:spPr>
-          <p:style>
-            <a:lnRef idx="1">
-              <a:schemeClr val="accent1"/>
-            </a:lnRef>
-            <a:fillRef idx="3">
-              <a:schemeClr val="accent1"/>
-            </a:fillRef>
-            <a:effectRef idx="2">
-              <a:schemeClr val="accent1"/>
-            </a:effectRef>
-            <a:fontRef idx="minor">
-              <a:schemeClr val="lt1"/>
-            </a:fontRef>
-          </p:style>
-          <p:txBody>
-            <a:bodyPr rtlCol="0" anchor="ctr"/>
-            <a:lstStyle/>
-            <a:p>
-              <a:pPr algn="ctr"/>
-              <a:r>
-                <a:rPr lang="en-US" dirty="0" err="1" smtClean="0">
-                  <a:solidFill>
-                    <a:srgbClr val="262626"/>
-                  </a:solidFill>
-                </a:rPr>
-                <a:t>Postgres</a:t>
-              </a:r>
-              <a:endParaRPr lang="en-US" dirty="0" smtClean="0">
-                <a:solidFill>
-                  <a:srgbClr val="262626"/>
-                </a:solidFill>
-              </a:endParaRPr>
-            </a:p>
-            <a:p>
-              <a:pPr algn="ctr"/>
-              <a:r>
-                <a:rPr lang="en-US" sz="1050" dirty="0" smtClean="0">
-                  <a:solidFill>
-                    <a:srgbClr val="262626"/>
-                  </a:solidFill>
-                </a:rPr>
-                <a:t>10.68.45.151</a:t>
-              </a:r>
-              <a:endParaRPr lang="en-US" sz="1050" dirty="0">
-                <a:solidFill>
-                  <a:srgbClr val="262626"/>
-                </a:solidFill>
-              </a:endParaRPr>
-            </a:p>
-          </p:txBody>
-        </p:sp>
-        <p:sp>
-          <p:nvSpPr>
-            <p:cNvPr id="23" name="TextBox 22"/>
-            <p:cNvSpPr txBox="1"/>
-            <p:nvPr/>
-          </p:nvSpPr>
-          <p:spPr>
-            <a:xfrm>
-              <a:off x="2971294" y="3110011"/>
-              <a:ext cx="928459" cy="523220"/>
-            </a:xfrm>
-            <a:prstGeom prst="rect">
-              <a:avLst/>
-            </a:prstGeom>
-            <a:noFill/>
-          </p:spPr>
-          <p:txBody>
-            <a:bodyPr wrap="none" rtlCol="0">
-              <a:spAutoFit/>
-            </a:bodyPr>
-            <a:lstStyle/>
-            <a:p>
-              <a:r>
-                <a:rPr lang="en-US" dirty="0" smtClean="0"/>
-                <a:t>Warden</a:t>
-              </a:r>
-              <a:br>
-                <a:rPr lang="en-US" dirty="0" smtClean="0"/>
-              </a:br>
-              <a:r>
-                <a:rPr lang="en-US" dirty="0" smtClean="0"/>
-                <a:t>container</a:t>
-              </a:r>
-            </a:p>
-          </p:txBody>
-        </p:sp>
-        <p:sp>
-          <p:nvSpPr>
-            <p:cNvPr id="30" name="Rectangle 29"/>
-            <p:cNvSpPr/>
-            <p:nvPr/>
-          </p:nvSpPr>
-          <p:spPr>
-            <a:xfrm>
-              <a:off x="3899753" y="3175000"/>
-              <a:ext cx="951647" cy="440033"/>
-            </a:xfrm>
-            <a:prstGeom prst="rect">
-              <a:avLst/>
-            </a:prstGeom>
-          </p:spPr>
-          <p:style>
-            <a:lnRef idx="1">
-              <a:schemeClr val="accent1"/>
-            </a:lnRef>
-            <a:fillRef idx="3">
-              <a:schemeClr val="accent1"/>
-            </a:fillRef>
-            <a:effectRef idx="2">
-              <a:schemeClr val="accent1"/>
-            </a:effectRef>
-            <a:fontRef idx="minor">
-              <a:schemeClr val="lt1"/>
-            </a:fontRef>
-          </p:style>
-          <p:txBody>
-            <a:bodyPr rtlCol="0" anchor="ctr"/>
-            <a:lstStyle/>
-            <a:p>
-              <a:pPr algn="ctr"/>
-              <a:r>
-                <a:rPr lang="en-US" dirty="0" smtClean="0"/>
-                <a:t>Bosh</a:t>
-              </a:r>
-              <a:br>
-                <a:rPr lang="en-US" dirty="0" smtClean="0"/>
-              </a:br>
-              <a:r>
-                <a:rPr lang="en-US" dirty="0" smtClean="0"/>
-                <a:t>Director</a:t>
-              </a:r>
-              <a:endParaRPr lang="en-US" dirty="0"/>
-            </a:p>
-          </p:txBody>
-        </p:sp>
-      </p:grpSp>
-      <p:pic>
-        <p:nvPicPr>
-          <p:cNvPr id="31" name="Picture 30"/>
-          <p:cNvPicPr>
-            <a:picLocks noChangeAspect="1"/>
-          </p:cNvPicPr>
-          <p:nvPr/>
-        </p:nvPicPr>
-        <p:blipFill rotWithShape="1">
-          <a:blip r:embed="rId5"/>
-          <a:srcRect t="5384" r="8143" b="-5384"/>
-          <a:stretch/>
-        </p:blipFill>
-        <p:spPr>
-          <a:xfrm>
-            <a:off x="2184400" y="1325880"/>
-            <a:ext cx="6217920" cy="330200"/>
-          </a:xfrm>
-          <a:prstGeom prst="rect">
-            <a:avLst/>
-          </a:prstGeom>
-        </p:spPr>
-      </p:pic>
-      <p:pic>
-        <p:nvPicPr>
-          <p:cNvPr id="32" name="Shape 218"/>
-          <p:cNvPicPr preferRelativeResize="0"/>
-          <p:nvPr/>
-        </p:nvPicPr>
-        <p:blipFill rotWithShape="1">
-          <a:blip r:embed="rId6">
-            <a:alphaModFix/>
-          </a:blip>
-          <a:srcRect/>
-          <a:stretch/>
-        </p:blipFill>
-        <p:spPr>
-          <a:xfrm>
-            <a:off x="393925" y="2368853"/>
-            <a:ext cx="397815" cy="621693"/>
-          </a:xfrm>
-          <a:prstGeom prst="rect">
-            <a:avLst/>
-          </a:prstGeom>
-          <a:noFill/>
-          <a:ln>
-            <a:noFill/>
-          </a:ln>
-        </p:spPr>
-      </p:pic>
-      <p:sp>
-        <p:nvSpPr>
-          <p:cNvPr id="33" name="TextBox 32"/>
-          <p:cNvSpPr txBox="1"/>
-          <p:nvPr/>
-        </p:nvSpPr>
-        <p:spPr>
-          <a:xfrm>
-            <a:off x="1265755" y="4000500"/>
-            <a:ext cx="783676" cy="307777"/>
-          </a:xfrm>
-          <a:prstGeom prst="rect">
-            <a:avLst/>
-          </a:prstGeom>
-          <a:noFill/>
-        </p:spPr>
-        <p:txBody>
-          <a:bodyPr wrap="none" rtlCol="0">
-            <a:spAutoFit/>
-          </a:bodyPr>
-          <a:lstStyle/>
-          <a:p>
-            <a:r>
-              <a:rPr lang="en-US" dirty="0" smtClean="0">
-                <a:solidFill>
-                  <a:schemeClr val="bg1"/>
-                </a:solidFill>
-              </a:rPr>
-              <a:t>Laptop:</a:t>
-            </a:r>
-          </a:p>
-        </p:txBody>
-      </p:sp>
-    </p:spTree>
-    <p:extLst>
-      <p:ext uri="{BB962C8B-B14F-4D97-AF65-F5344CB8AC3E}">
-        <p14:creationId xmlns:p14="http://schemas.microsoft.com/office/powerpoint/2010/main" val="1390493818"/>
-      </p:ext>
-    </p:extLst>
-  </p:cSld>
-  <p:clrMapOvr>
-    <a:masterClrMapping/>
-  </p:clrMapOvr>
 </p:sld>
 </file>
 

</xml_diff>